<commit_message>
added confusion matrix example
</commit_message>
<xml_diff>
--- a/Documents/70-OtherMachineLearningModels.pptx
+++ b/Documents/70-OtherMachineLearningModels.pptx
@@ -5,10 +5,10 @@
     <p:sldMasterId id="2147483648" r:id="rId1"/>
   </p:sldMasterIdLst>
   <p:notesMasterIdLst>
-    <p:notesMasterId r:id="rId10"/>
+    <p:notesMasterId r:id="rId13"/>
   </p:notesMasterIdLst>
   <p:handoutMasterIdLst>
-    <p:handoutMasterId r:id="rId11"/>
+    <p:handoutMasterId r:id="rId14"/>
   </p:handoutMasterIdLst>
   <p:sldIdLst>
     <p:sldId id="261" r:id="rId2"/>
@@ -19,6 +19,9 @@
     <p:sldId id="267" r:id="rId7"/>
     <p:sldId id="262" r:id="rId8"/>
     <p:sldId id="268" r:id="rId9"/>
+    <p:sldId id="269" r:id="rId10"/>
+    <p:sldId id="270" r:id="rId11"/>
+    <p:sldId id="271" r:id="rId12"/>
   </p:sldIdLst>
   <p:sldSz cx="9144000" cy="6858000" type="screen4x3"/>
   <p:notesSz cx="6858000" cy="9144000"/>
@@ -204,7 +207,7 @@
             <a:fld id="{D83FDC75-7F73-4A4A-A77C-09AADF00E0EA}" type="datetimeFigureOut">
               <a:rPr lang="en-US" smtClean="0"/>
               <a:pPr/>
-              <a:t>5/18/18</a:t>
+              <a:t>5/19/18</a:t>
             </a:fld>
             <a:endParaRPr lang="en-US" dirty="0"/>
           </a:p>
@@ -371,7 +374,7 @@
             <a:fld id="{48AEF76B-3757-4A0B-AF93-28494465C1DD}" type="datetimeFigureOut">
               <a:rPr lang="en-US" smtClean="0"/>
               <a:pPr/>
-              <a:t>5/18/18</a:t>
+              <a:t>5/19/18</a:t>
             </a:fld>
             <a:endParaRPr lang="en-US" dirty="0"/>
           </a:p>
@@ -1108,7 +1111,7 @@
             <a:fld id="{757B281C-5159-4971-8228-52B9A72E9ED2}" type="datetimeFigureOut">
               <a:rPr lang="en-US" smtClean="0"/>
               <a:pPr/>
-              <a:t>5/18/18</a:t>
+              <a:t>5/19/18</a:t>
             </a:fld>
             <a:endParaRPr lang="en-US" dirty="0"/>
           </a:p>
@@ -1210,7 +1213,7 @@
             <a:fld id="{757B281C-5159-4971-8228-52B9A72E9ED2}" type="datetimeFigureOut">
               <a:rPr lang="en-US" smtClean="0"/>
               <a:pPr/>
-              <a:t>5/18/18</a:t>
+              <a:t>5/19/18</a:t>
             </a:fld>
             <a:endParaRPr lang="en-US" dirty="0"/>
           </a:p>
@@ -1346,7 +1349,7 @@
             <a:fld id="{757B281C-5159-4971-8228-52B9A72E9ED2}" type="datetimeFigureOut">
               <a:rPr lang="en-US" smtClean="0"/>
               <a:pPr/>
-              <a:t>5/18/18</a:t>
+              <a:t>5/19/18</a:t>
             </a:fld>
             <a:endParaRPr lang="en-US" dirty="0"/>
           </a:p>
@@ -1552,7 +1555,7 @@
             <a:fld id="{757B281C-5159-4971-8228-52B9A72E9ED2}" type="datetimeFigureOut">
               <a:rPr lang="en-US" smtClean="0"/>
               <a:pPr/>
-              <a:t>5/18/18</a:t>
+              <a:t>5/19/18</a:t>
             </a:fld>
             <a:endParaRPr lang="en-US" dirty="0"/>
           </a:p>
@@ -1932,7 +1935,7 @@
             <a:fld id="{757B281C-5159-4971-8228-52B9A72E9ED2}" type="datetimeFigureOut">
               <a:rPr lang="en-US" smtClean="0"/>
               <a:pPr/>
-              <a:t>5/18/18</a:t>
+              <a:t>5/19/18</a:t>
             </a:fld>
             <a:endParaRPr lang="en-US" dirty="0"/>
           </a:p>
@@ -2232,7 +2235,7 @@
             <a:fld id="{757B281C-5159-4971-8228-52B9A72E9ED2}" type="datetimeFigureOut">
               <a:rPr lang="en-US" smtClean="0"/>
               <a:pPr/>
-              <a:t>5/18/18</a:t>
+              <a:t>5/19/18</a:t>
             </a:fld>
             <a:endParaRPr lang="en-US" dirty="0"/>
           </a:p>
@@ -2661,7 +2664,7 @@
             <a:fld id="{757B281C-5159-4971-8228-52B9A72E9ED2}" type="datetimeFigureOut">
               <a:rPr lang="en-US" smtClean="0"/>
               <a:pPr/>
-              <a:t>5/18/18</a:t>
+              <a:t>5/19/18</a:t>
             </a:fld>
             <a:endParaRPr lang="en-US" dirty="0"/>
           </a:p>
@@ -2938,7 +2941,7 @@
             <a:fld id="{757B281C-5159-4971-8228-52B9A72E9ED2}" type="datetimeFigureOut">
               <a:rPr lang="en-US" smtClean="0"/>
               <a:pPr/>
-              <a:t>5/18/18</a:t>
+              <a:t>5/19/18</a:t>
             </a:fld>
             <a:endParaRPr lang="en-US" dirty="0"/>
           </a:p>
@@ -3202,7 +3205,7 @@
             <a:fld id="{757B281C-5159-4971-8228-52B9A72E9ED2}" type="datetimeFigureOut">
               <a:rPr lang="en-US" smtClean="0"/>
               <a:pPr/>
-              <a:t>5/18/18</a:t>
+              <a:t>5/19/18</a:t>
             </a:fld>
             <a:endParaRPr lang="en-US" dirty="0"/>
           </a:p>
@@ -3372,7 +3375,7 @@
             <a:fld id="{757B281C-5159-4971-8228-52B9A72E9ED2}" type="datetimeFigureOut">
               <a:rPr lang="en-US" smtClean="0"/>
               <a:pPr/>
-              <a:t>5/18/18</a:t>
+              <a:t>5/19/18</a:t>
             </a:fld>
             <a:endParaRPr lang="en-US" dirty="0"/>
           </a:p>
@@ -3552,7 +3555,7 @@
             <a:fld id="{757B281C-5159-4971-8228-52B9A72E9ED2}" type="datetimeFigureOut">
               <a:rPr lang="en-US" smtClean="0"/>
               <a:pPr/>
-              <a:t>5/18/18</a:t>
+              <a:t>5/19/18</a:t>
             </a:fld>
             <a:endParaRPr lang="en-US" dirty="0"/>
           </a:p>
@@ -3794,7 +3797,7 @@
             <a:fld id="{757B281C-5159-4971-8228-52B9A72E9ED2}" type="datetimeFigureOut">
               <a:rPr lang="en-US" smtClean="0"/>
               <a:pPr/>
-              <a:t>5/18/18</a:t>
+              <a:t>5/19/18</a:t>
             </a:fld>
             <a:endParaRPr lang="en-US" dirty="0"/>
           </a:p>
@@ -4281,6 +4284,196 @@
 </p:sld>
 </file>
 
+<file path=ppt/slides/slide10.xml><?xml version="1.0" encoding="utf-8"?>
+<p:sld xmlns:a="http://schemas.openxmlformats.org/drawingml/2006/main" xmlns:r="http://schemas.openxmlformats.org/officeDocument/2006/relationships" xmlns:p="http://schemas.openxmlformats.org/presentationml/2006/main">
+  <p:cSld>
+    <p:spTree>
+      <p:nvGrpSpPr>
+        <p:cNvPr id="1" name=""/>
+        <p:cNvGrpSpPr/>
+        <p:nvPr/>
+      </p:nvGrpSpPr>
+      <p:grpSpPr>
+        <a:xfrm>
+          <a:off x="0" y="0"/>
+          <a:ext cx="0" cy="0"/>
+          <a:chOff x="0" y="0"/>
+          <a:chExt cx="0" cy="0"/>
+        </a:xfrm>
+      </p:grpSpPr>
+      <p:sp>
+        <p:nvSpPr>
+          <p:cNvPr id="2" name="Title 1"/>
+          <p:cNvSpPr>
+            <a:spLocks noGrp="1"/>
+          </p:cNvSpPr>
+          <p:nvPr>
+            <p:ph type="title"/>
+          </p:nvPr>
+        </p:nvSpPr>
+        <p:spPr/>
+        <p:txBody>
+          <a:bodyPr/>
+          <a:lstStyle/>
+          <a:p>
+            <a:r>
+              <a:rPr lang="en-US" dirty="0" smtClean="0"/>
+              <a:t>Simple classifier</a:t>
+            </a:r>
+            <a:endParaRPr lang="en-US" dirty="0"/>
+          </a:p>
+        </p:txBody>
+      </p:sp>
+      <p:pic>
+        <p:nvPicPr>
+          <p:cNvPr id="7" name="Picture 6"/>
+          <p:cNvPicPr>
+            <a:picLocks noChangeAspect="1"/>
+          </p:cNvPicPr>
+          <p:nvPr/>
+        </p:nvPicPr>
+        <p:blipFill>
+          <a:blip r:embed="rId2"/>
+          <a:stretch>
+            <a:fillRect/>
+          </a:stretch>
+        </p:blipFill>
+        <p:spPr>
+          <a:xfrm>
+            <a:off x="2184400" y="1803400"/>
+            <a:ext cx="5969000" cy="4064000"/>
+          </a:xfrm>
+          <a:prstGeom prst="rect">
+            <a:avLst/>
+          </a:prstGeom>
+        </p:spPr>
+      </p:pic>
+    </p:spTree>
+    <p:extLst>
+      <p:ext uri="{BB962C8B-B14F-4D97-AF65-F5344CB8AC3E}">
+        <p14:creationId xmlns:p14="http://schemas.microsoft.com/office/powerpoint/2010/main" val="1888083588"/>
+      </p:ext>
+    </p:extLst>
+  </p:cSld>
+  <p:clrMapOvr>
+    <a:masterClrMapping/>
+  </p:clrMapOvr>
+  <p:transition xmlns:p14="http://schemas.microsoft.com/office/powerpoint/2010/main" spd="slow">
+    <p:wipe dir="d"/>
+  </p:transition>
+</p:sld>
+</file>
+
+<file path=ppt/slides/slide11.xml><?xml version="1.0" encoding="utf-8"?>
+<p:sld xmlns:a="http://schemas.openxmlformats.org/drawingml/2006/main" xmlns:r="http://schemas.openxmlformats.org/officeDocument/2006/relationships" xmlns:p="http://schemas.openxmlformats.org/presentationml/2006/main">
+  <p:cSld>
+    <p:spTree>
+      <p:nvGrpSpPr>
+        <p:cNvPr id="1" name=""/>
+        <p:cNvGrpSpPr/>
+        <p:nvPr/>
+      </p:nvGrpSpPr>
+      <p:grpSpPr>
+        <a:xfrm>
+          <a:off x="0" y="0"/>
+          <a:ext cx="0" cy="0"/>
+          <a:chOff x="0" y="0"/>
+          <a:chExt cx="0" cy="0"/>
+        </a:xfrm>
+      </p:grpSpPr>
+      <p:sp>
+        <p:nvSpPr>
+          <p:cNvPr id="2" name="Title 1"/>
+          <p:cNvSpPr>
+            <a:spLocks noGrp="1"/>
+          </p:cNvSpPr>
+          <p:nvPr>
+            <p:ph type="title"/>
+          </p:nvPr>
+        </p:nvSpPr>
+        <p:spPr/>
+        <p:txBody>
+          <a:bodyPr/>
+          <a:lstStyle/>
+          <a:p>
+            <a:r>
+              <a:rPr lang="en-US" dirty="0" smtClean="0"/>
+              <a:t>How to Measure Accuracy</a:t>
+            </a:r>
+            <a:endParaRPr lang="en-US" dirty="0"/>
+          </a:p>
+        </p:txBody>
+      </p:sp>
+      <p:pic>
+        <p:nvPicPr>
+          <p:cNvPr id="4" name="Picture 3"/>
+          <p:cNvPicPr>
+            <a:picLocks noChangeAspect="1"/>
+          </p:cNvPicPr>
+          <p:nvPr/>
+        </p:nvPicPr>
+        <p:blipFill>
+          <a:blip r:embed="rId2"/>
+          <a:stretch>
+            <a:fillRect/>
+          </a:stretch>
+        </p:blipFill>
+        <p:spPr>
+          <a:xfrm>
+            <a:off x="1295400" y="1828800"/>
+            <a:ext cx="6988900" cy="3898900"/>
+          </a:xfrm>
+          <a:prstGeom prst="rect">
+            <a:avLst/>
+          </a:prstGeom>
+        </p:spPr>
+      </p:pic>
+      <p:sp>
+        <p:nvSpPr>
+          <p:cNvPr id="5" name="TextBox 4"/>
+          <p:cNvSpPr txBox="1"/>
+          <p:nvPr/>
+        </p:nvSpPr>
+        <p:spPr>
+          <a:xfrm>
+            <a:off x="1143000" y="6096000"/>
+            <a:ext cx="6629400" cy="461665"/>
+          </a:xfrm>
+          <a:prstGeom prst="rect">
+            <a:avLst/>
+          </a:prstGeom>
+          <a:noFill/>
+        </p:spPr>
+        <p:txBody>
+          <a:bodyPr wrap="square" rtlCol="0">
+            <a:spAutoFit/>
+          </a:bodyPr>
+          <a:lstStyle/>
+          <a:p>
+            <a:r>
+              <a:rPr lang="en-US" sz="2400" dirty="0" smtClean="0"/>
+              <a:t>This is called a “Confusion Matrix”</a:t>
+            </a:r>
+            <a:endParaRPr lang="en-US" sz="2400" dirty="0"/>
+          </a:p>
+        </p:txBody>
+      </p:sp>
+    </p:spTree>
+    <p:extLst>
+      <p:ext uri="{BB962C8B-B14F-4D97-AF65-F5344CB8AC3E}">
+        <p14:creationId xmlns:p14="http://schemas.microsoft.com/office/powerpoint/2010/main" val="905695048"/>
+      </p:ext>
+    </p:extLst>
+  </p:cSld>
+  <p:clrMapOvr>
+    <a:masterClrMapping/>
+  </p:clrMapOvr>
+  <p:transition xmlns:p14="http://schemas.microsoft.com/office/powerpoint/2010/main" spd="slow">
+    <p:wipe dir="d"/>
+  </p:transition>
+</p:sld>
+</file>
+
 <file path=ppt/slides/slide2.xml><?xml version="1.0" encoding="utf-8"?>
 <p:sld xmlns:a="http://schemas.openxmlformats.org/drawingml/2006/main" xmlns:r="http://schemas.openxmlformats.org/officeDocument/2006/relationships" xmlns:p="http://schemas.openxmlformats.org/presentationml/2006/main">
   <p:cSld>
@@ -4904,6 +5097,109 @@
     <p:extLst>
       <p:ext uri="{BB962C8B-B14F-4D97-AF65-F5344CB8AC3E}">
         <p14:creationId xmlns:p14="http://schemas.microsoft.com/office/powerpoint/2010/main" val="3301944620"/>
+      </p:ext>
+    </p:extLst>
+  </p:cSld>
+  <p:clrMapOvr>
+    <a:masterClrMapping/>
+  </p:clrMapOvr>
+  <p:transition xmlns:p14="http://schemas.microsoft.com/office/powerpoint/2010/main" spd="slow">
+    <p:wipe dir="d"/>
+  </p:transition>
+</p:sld>
+</file>
+
+<file path=ppt/slides/slide9.xml><?xml version="1.0" encoding="utf-8"?>
+<p:sld xmlns:a="http://schemas.openxmlformats.org/drawingml/2006/main" xmlns:r="http://schemas.openxmlformats.org/officeDocument/2006/relationships" xmlns:p="http://schemas.openxmlformats.org/presentationml/2006/main">
+  <p:cSld>
+    <p:spTree>
+      <p:nvGrpSpPr>
+        <p:cNvPr id="1" name=""/>
+        <p:cNvGrpSpPr/>
+        <p:nvPr/>
+      </p:nvGrpSpPr>
+      <p:grpSpPr>
+        <a:xfrm>
+          <a:off x="0" y="0"/>
+          <a:ext cx="0" cy="0"/>
+          <a:chOff x="0" y="0"/>
+          <a:chExt cx="0" cy="0"/>
+        </a:xfrm>
+      </p:grpSpPr>
+      <p:sp>
+        <p:nvSpPr>
+          <p:cNvPr id="2" name="Title 1"/>
+          <p:cNvSpPr>
+            <a:spLocks noGrp="1"/>
+          </p:cNvSpPr>
+          <p:nvPr>
+            <p:ph type="title"/>
+          </p:nvPr>
+        </p:nvSpPr>
+        <p:spPr/>
+        <p:txBody>
+          <a:bodyPr/>
+          <a:lstStyle/>
+          <a:p>
+            <a:r>
+              <a:rPr lang="en-US" dirty="0" smtClean="0"/>
+              <a:t>Classification Example</a:t>
+            </a:r>
+            <a:endParaRPr lang="en-US" dirty="0"/>
+          </a:p>
+        </p:txBody>
+      </p:sp>
+      <p:sp>
+        <p:nvSpPr>
+          <p:cNvPr id="3" name="Content Placeholder 2"/>
+          <p:cNvSpPr>
+            <a:spLocks noGrp="1"/>
+          </p:cNvSpPr>
+          <p:nvPr>
+            <p:ph idx="1"/>
+          </p:nvPr>
+        </p:nvSpPr>
+        <p:spPr/>
+        <p:txBody>
+          <a:bodyPr/>
+          <a:lstStyle/>
+          <a:p>
+            <a:r>
+              <a:rPr lang="en-US" dirty="0" smtClean="0"/>
+              <a:t>We will use MNIST handwritten digits dataset</a:t>
+            </a:r>
+            <a:endParaRPr lang="en-US" dirty="0"/>
+          </a:p>
+        </p:txBody>
+      </p:sp>
+      <p:pic>
+        <p:nvPicPr>
+          <p:cNvPr id="4" name="Picture 3"/>
+          <p:cNvPicPr>
+            <a:picLocks noChangeAspect="1"/>
+          </p:cNvPicPr>
+          <p:nvPr/>
+        </p:nvPicPr>
+        <p:blipFill>
+          <a:blip r:embed="rId2"/>
+          <a:stretch>
+            <a:fillRect/>
+          </a:stretch>
+        </p:blipFill>
+        <p:spPr>
+          <a:xfrm>
+            <a:off x="1828800" y="2167254"/>
+            <a:ext cx="6781800" cy="4690745"/>
+          </a:xfrm>
+          <a:prstGeom prst="rect">
+            <a:avLst/>
+          </a:prstGeom>
+        </p:spPr>
+      </p:pic>
+    </p:spTree>
+    <p:extLst>
+      <p:ext uri="{BB962C8B-B14F-4D97-AF65-F5344CB8AC3E}">
+        <p14:creationId xmlns:p14="http://schemas.microsoft.com/office/powerpoint/2010/main" val="1021685127"/>
       </p:ext>
     </p:extLst>
   </p:cSld>

</xml_diff>